<commit_message>
more work on slides
</commit_message>
<xml_diff>
--- a/SNIA SDC 2018.pptx
+++ b/SNIA SDC 2018.pptx
@@ -2278,22 +2278,15 @@
               <a:buNone/>
             </a:pPr>
             <a:r>
-              <a:rPr lang="en-US" altLang="en-US" sz="1000" b="1">
+              <a:rPr lang="en-US" altLang="en-US" sz="1000" b="1" dirty="0">
                 <a:solidFill>
                   <a:srgbClr val="52237F"/>
                 </a:solidFill>
                 <a:latin typeface="Arial" charset="0"/>
                 <a:cs typeface="Arial" charset="0"/>
               </a:rPr>
-              <a:t>Version 0.5.5</a:t>
-            </a:r>
-            <a:endParaRPr lang="en-US" altLang="en-US" sz="1000" b="1" dirty="0">
-              <a:solidFill>
-                <a:srgbClr val="52237F"/>
-              </a:solidFill>
-              <a:latin typeface="Arial" charset="0"/>
-              <a:cs typeface="Arial" charset="0"/>
-            </a:endParaRPr>
+              <a:t>Version 0.6</a:t>
+            </a:r>
           </a:p>
           <a:p>
             <a:endParaRPr lang="en-US" altLang="en-US" dirty="0">
@@ -5648,7 +5641,7 @@
           <a:p>
             <a:r>
               <a:rPr lang="en-GB" sz="1400" dirty="0"/>
-              <a:t>2017: Programming the Path: </a:t>
+              <a:t>2017: Programming the Path:</a:t>
             </a:r>
           </a:p>
           <a:p>
@@ -5658,7 +5651,20 @@
               </a:rPr>
               <a:t>https://www.snia.org/sites/default/files/SDC/2017/presentations/File_Systems/Cain_James_Westland_Programming_the_Path.pdf</a:t>
             </a:r>
-            <a:endParaRPr lang="en-GB" sz="1400" dirty="0"/>
+            <a:r>
+              <a:rPr lang="en-GB" sz="1400" dirty="0"/>
+              <a:t> (Video: </a:t>
+            </a:r>
+            <a:r>
+              <a:rPr lang="en-GB" sz="1400" dirty="0">
+                <a:hlinkClick r:id="rId6"/>
+              </a:rPr>
+              <a:t>https://www.youtube.com/watch?v=RNqYlQU_QX0</a:t>
+            </a:r>
+            <a:r>
+              <a:rPr lang="en-GB" sz="1400" dirty="0"/>
+              <a:t> )</a:t>
+            </a:r>
           </a:p>
         </p:txBody>
       </p:sp>
@@ -6871,7 +6877,21 @@
                 <a:latin typeface="Courier New" panose="02070309020205020404" pitchFamily="49" charset="0"/>
                 <a:cs typeface="Courier New" panose="02070309020205020404" pitchFamily="49" charset="0"/>
               </a:rPr>
-              <a:t>|      extension|     total code|  total comment|    total </a:t>
+              <a:t>|      extension|     </a:t>
+            </a:r>
+            <a:r>
+              <a:rPr lang="en-GB" sz="1200" b="1" dirty="0">
+                <a:latin typeface="Courier New" panose="02070309020205020404" pitchFamily="49" charset="0"/>
+                <a:cs typeface="Courier New" panose="02070309020205020404" pitchFamily="49" charset="0"/>
+              </a:rPr>
+              <a:t>total code</a:t>
+            </a:r>
+            <a:r>
+              <a:rPr lang="en-GB" sz="1200" dirty="0">
+                <a:latin typeface="Courier New" panose="02070309020205020404" pitchFamily="49" charset="0"/>
+                <a:cs typeface="Courier New" panose="02070309020205020404" pitchFamily="49" charset="0"/>
+              </a:rPr>
+              <a:t>|  total comment|    total </a:t>
             </a:r>
             <a:r>
               <a:rPr lang="en-GB" sz="1200" dirty="0" err="1">
@@ -6917,16 +6937,44 @@
                 <a:latin typeface="Courier New" panose="02070309020205020404" pitchFamily="49" charset="0"/>
                 <a:cs typeface="Courier New" panose="02070309020205020404" pitchFamily="49" charset="0"/>
               </a:rPr>
-              <a:t>|            421|            169|            146|     47|</a:t>
-            </a:r>
-          </a:p>
-          <a:p>
+              <a:t>|            </a:t>
+            </a:r>
+            <a:r>
+              <a:rPr lang="en-GB" sz="1200" b="1" dirty="0">
+                <a:latin typeface="Courier New" panose="02070309020205020404" pitchFamily="49" charset="0"/>
+                <a:cs typeface="Courier New" panose="02070309020205020404" pitchFamily="49" charset="0"/>
+              </a:rPr>
+              <a:t>421</a:t>
+            </a:r>
             <a:r>
               <a:rPr lang="en-GB" sz="1200" dirty="0">
                 <a:latin typeface="Courier New" panose="02070309020205020404" pitchFamily="49" charset="0"/>
                 <a:cs typeface="Courier New" panose="02070309020205020404" pitchFamily="49" charset="0"/>
               </a:rPr>
-              <a:t>|             .h|            161|            171|             99|     18|</a:t>
+              <a:t>|            169|            146|     47|</a:t>
+            </a:r>
+          </a:p>
+          <a:p>
+            <a:r>
+              <a:rPr lang="en-GB" sz="1200" dirty="0">
+                <a:latin typeface="Courier New" panose="02070309020205020404" pitchFamily="49" charset="0"/>
+                <a:cs typeface="Courier New" panose="02070309020205020404" pitchFamily="49" charset="0"/>
+              </a:rPr>
+              <a:t>|             .h|            </a:t>
+            </a:r>
+            <a:r>
+              <a:rPr lang="en-GB" sz="1200" b="1" dirty="0">
+                <a:latin typeface="Courier New" panose="02070309020205020404" pitchFamily="49" charset="0"/>
+                <a:cs typeface="Courier New" panose="02070309020205020404" pitchFamily="49" charset="0"/>
+              </a:rPr>
+              <a:t>161</a:t>
+            </a:r>
+            <a:r>
+              <a:rPr lang="en-GB" sz="1200" dirty="0">
+                <a:latin typeface="Courier New" panose="02070309020205020404" pitchFamily="49" charset="0"/>
+                <a:cs typeface="Courier New" panose="02070309020205020404" pitchFamily="49" charset="0"/>
+              </a:rPr>
+              <a:t>|            171|             99|     18|</a:t>
             </a:r>
           </a:p>
         </p:txBody>
@@ -10355,44 +10403,51 @@
           <a:lstStyle/>
           <a:p>
             <a:r>
-              <a:rPr lang="en-GB" dirty="0"/>
+              <a:rPr lang="en-GB" sz="2400" dirty="0"/>
               <a:t>The competition listed in the front matter were all using </a:t>
             </a:r>
             <a:r>
-              <a:rPr lang="en-GB" dirty="0" err="1"/>
+              <a:rPr lang="en-GB" sz="2400" dirty="0" err="1"/>
               <a:t>IFSKit</a:t>
             </a:r>
             <a:r>
-              <a:rPr lang="en-GB" dirty="0"/>
+              <a:rPr lang="en-GB" sz="2400" dirty="0"/>
               <a:t> style Kernel mode drivers to build loopback filesystems.</a:t>
             </a:r>
           </a:p>
           <a:p>
             <a:r>
-              <a:rPr lang="en-GB" dirty="0"/>
+              <a:rPr lang="en-GB" sz="2400" dirty="0"/>
               <a:t>Our VFS is a NAS protocol server.</a:t>
             </a:r>
           </a:p>
           <a:p>
-            <a:r>
-              <a:rPr lang="en-GB" dirty="0"/>
+            <a:pPr lvl="1"/>
+            <a:r>
+              <a:rPr lang="en-GB" sz="2400" dirty="0"/>
+              <a:t>Its so much more than just Loopback!</a:t>
+            </a:r>
+          </a:p>
+          <a:p>
+            <a:r>
+              <a:rPr lang="en-GB" sz="2400" dirty="0"/>
               <a:t>Its has been tested against numerous clients, including OS-X, Linux, Solaris and Windows.</a:t>
             </a:r>
           </a:p>
           <a:p>
             <a:pPr lvl="1"/>
             <a:r>
-              <a:rPr lang="en-GB" dirty="0"/>
+              <a:rPr lang="en-GB" sz="2400" dirty="0"/>
               <a:t>No warranties though </a:t>
             </a:r>
             <a:r>
-              <a:rPr lang="en-GB" dirty="0">
+              <a:rPr lang="en-GB" sz="2400" dirty="0">
                 <a:sym typeface="Wingdings" panose="05000000000000000000" pitchFamily="2" charset="2"/>
               </a:rPr>
               <a:t></a:t>
             </a:r>
             <a:r>
-              <a:rPr lang="en-GB" dirty="0"/>
+              <a:rPr lang="en-GB" sz="2400" dirty="0"/>
               <a:t> </a:t>
             </a:r>
           </a:p>

</xml_diff>